<commit_message>
Upload 3.pptx and Add Indexed
</commit_message>
<xml_diff>
--- a/2.pptx
+++ b/2.pptx
@@ -12,14 +12,28 @@
     <p:sldId id="282" r:id="rId6"/>
     <p:sldId id="283" r:id="rId7"/>
     <p:sldId id="284" r:id="rId8"/>
-    <p:sldId id="292" r:id="rId9"/>
-    <p:sldId id="291" r:id="rId10"/>
-    <p:sldId id="285" r:id="rId11"/>
-    <p:sldId id="286" r:id="rId12"/>
-    <p:sldId id="290" r:id="rId13"/>
-    <p:sldId id="294" r:id="rId14"/>
-    <p:sldId id="295" r:id="rId15"/>
-    <p:sldId id="296" r:id="rId16"/>
+    <p:sldId id="297" r:id="rId9"/>
+    <p:sldId id="292" r:id="rId10"/>
+    <p:sldId id="298" r:id="rId11"/>
+    <p:sldId id="285" r:id="rId12"/>
+    <p:sldId id="286" r:id="rId13"/>
+    <p:sldId id="300" r:id="rId14"/>
+    <p:sldId id="291" r:id="rId15"/>
+    <p:sldId id="299" r:id="rId16"/>
+    <p:sldId id="290" r:id="rId17"/>
+    <p:sldId id="294" r:id="rId18"/>
+    <p:sldId id="301" r:id="rId19"/>
+    <p:sldId id="302" r:id="rId20"/>
+    <p:sldId id="304" r:id="rId21"/>
+    <p:sldId id="305" r:id="rId22"/>
+    <p:sldId id="306" r:id="rId23"/>
+    <p:sldId id="307" r:id="rId24"/>
+    <p:sldId id="308" r:id="rId25"/>
+    <p:sldId id="309" r:id="rId26"/>
+    <p:sldId id="310" r:id="rId27"/>
+    <p:sldId id="311" r:id="rId28"/>
+    <p:sldId id="312" r:id="rId29"/>
+    <p:sldId id="313" r:id="rId30"/>
   </p:sldIdLst>
   <p:sldSz cx="12192000" cy="6858000"/>
   <p:notesSz cx="6858000" cy="9144000"/>
@@ -273,7 +287,7 @@
           <a:p>
             <a:fld id="{76969C88-B244-455D-A017-012B25B1ACDD}" type="datetimeFigureOut">
               <a:rPr lang="en-US" smtClean="0"/>
-              <a:t>1/30/2024</a:t>
+              <a:t>2/1/2024</a:t>
             </a:fld>
             <a:endParaRPr lang="en-US"/>
           </a:p>
@@ -487,7 +501,7 @@
           <a:p>
             <a:fld id="{76969C88-B244-455D-A017-012B25B1ACDD}" type="datetimeFigureOut">
               <a:rPr lang="en-US" smtClean="0"/>
-              <a:t>1/30/2024</a:t>
+              <a:t>2/1/2024</a:t>
             </a:fld>
             <a:endParaRPr lang="en-US"/>
           </a:p>
@@ -711,7 +725,7 @@
           <a:p>
             <a:fld id="{76969C88-B244-455D-A017-012B25B1ACDD}" type="datetimeFigureOut">
               <a:rPr lang="en-US" smtClean="0"/>
-              <a:t>1/30/2024</a:t>
+              <a:t>2/1/2024</a:t>
             </a:fld>
             <a:endParaRPr lang="en-US"/>
           </a:p>
@@ -951,7 +965,7 @@
           <a:p>
             <a:fld id="{76969C88-B244-455D-A017-012B25B1ACDD}" type="datetimeFigureOut">
               <a:rPr lang="en-US" smtClean="0"/>
-              <a:t>1/30/2024</a:t>
+              <a:t>2/1/2024</a:t>
             </a:fld>
             <a:endParaRPr lang="en-US" dirty="0"/>
           </a:p>
@@ -1172,7 +1186,7 @@
           <a:p>
             <a:fld id="{76969C88-B244-455D-A017-012B25B1ACDD}" type="datetimeFigureOut">
               <a:rPr lang="en-US" smtClean="0"/>
-              <a:t>1/30/2024</a:t>
+              <a:t>2/1/2024</a:t>
             </a:fld>
             <a:endParaRPr lang="en-US"/>
           </a:p>
@@ -1462,7 +1476,7 @@
           <a:p>
             <a:fld id="{76969C88-B244-455D-A017-012B25B1ACDD}" type="datetimeFigureOut">
               <a:rPr lang="en-US" smtClean="0"/>
-              <a:t>1/30/2024</a:t>
+              <a:t>2/1/2024</a:t>
             </a:fld>
             <a:endParaRPr lang="en-US"/>
           </a:p>
@@ -1820,7 +1834,7 @@
           <a:p>
             <a:fld id="{76969C88-B244-455D-A017-012B25B1ACDD}" type="datetimeFigureOut">
               <a:rPr lang="en-US" smtClean="0"/>
-              <a:t>1/30/2024</a:t>
+              <a:t>2/1/2024</a:t>
             </a:fld>
             <a:endParaRPr lang="en-US"/>
           </a:p>
@@ -1986,7 +2000,7 @@
           <a:p>
             <a:fld id="{76969C88-B244-455D-A017-012B25B1ACDD}" type="datetimeFigureOut">
               <a:rPr lang="en-US" smtClean="0"/>
-              <a:t>1/30/2024</a:t>
+              <a:t>2/1/2024</a:t>
             </a:fld>
             <a:endParaRPr lang="en-US"/>
           </a:p>
@@ -2045,7 +2059,7 @@
           <a:p>
             <a:fld id="{76969C88-B244-455D-A017-012B25B1ACDD}" type="datetimeFigureOut">
               <a:rPr lang="en-US" smtClean="0"/>
-              <a:t>1/30/2024</a:t>
+              <a:t>2/1/2024</a:t>
             </a:fld>
             <a:endParaRPr lang="en-US"/>
           </a:p>
@@ -2373,7 +2387,7 @@
           <a:p>
             <a:fld id="{76969C88-B244-455D-A017-012B25B1ACDD}" type="datetimeFigureOut">
               <a:rPr lang="en-US" smtClean="0"/>
-              <a:t>1/30/2024</a:t>
+              <a:t>2/1/2024</a:t>
             </a:fld>
             <a:endParaRPr lang="en-US"/>
           </a:p>
@@ -2680,7 +2694,7 @@
           <a:p>
             <a:fld id="{76969C88-B244-455D-A017-012B25B1ACDD}" type="datetimeFigureOut">
               <a:rPr lang="en-US" smtClean="0"/>
-              <a:t>1/30/2024</a:t>
+              <a:t>2/1/2024</a:t>
             </a:fld>
             <a:endParaRPr lang="en-US"/>
           </a:p>
@@ -3446,7 +3460,7 @@
             <a:fld id="{76969C88-B244-455D-A017-012B25B1ACDD}" type="datetimeFigureOut">
               <a:rPr lang="en-US" smtClean="0"/>
               <a:pPr/>
-              <a:t>1/30/2024</a:t>
+              <a:t>2/1/2024</a:t>
             </a:fld>
             <a:endParaRPr lang="en-US"/>
           </a:p>
@@ -4429,7 +4443,7 @@
           <p:cNvPr id="2" name="제목 1">
             <a:extLst>
               <a:ext uri="{FF2B5EF4-FFF2-40B4-BE49-F238E27FC236}">
-                <a16:creationId xmlns:a16="http://schemas.microsoft.com/office/drawing/2014/main" id="{33211138-9519-6CAD-1576-9825CBE35950}"/>
+                <a16:creationId xmlns:a16="http://schemas.microsoft.com/office/drawing/2014/main" id="{43D38F18-6FA0-0B1E-2019-1597F08872FF}"/>
               </a:ext>
             </a:extLst>
           </p:cNvPr>
@@ -4447,7 +4461,23 @@
           <a:p>
             <a:r>
               <a:rPr lang="en-US" altLang="ko-KR" dirty="0"/>
-              <a:t>3-way handshake</a:t>
+              <a:t>UDP</a:t>
+            </a:r>
+            <a:r>
+              <a:rPr lang="ko-KR" altLang="en-US" dirty="0"/>
+              <a:t> </a:t>
+            </a:r>
+            <a:r>
+              <a:rPr lang="en-US" altLang="ko-KR" dirty="0"/>
+              <a:t>Segment </a:t>
+            </a:r>
+            <a:r>
+              <a:rPr lang="ko-KR" altLang="en-US" dirty="0"/>
+              <a:t>구조 </a:t>
+            </a:r>
+            <a:r>
+              <a:rPr lang="en-US" altLang="ko-KR" dirty="0"/>
+              <a:t>2</a:t>
             </a:r>
             <a:endParaRPr lang="ko-KR" altLang="en-US" dirty="0"/>
           </a:p>
@@ -4458,7 +4488,7 @@
           <p:cNvPr id="3" name="내용 개체 틀 2">
             <a:extLst>
               <a:ext uri="{FF2B5EF4-FFF2-40B4-BE49-F238E27FC236}">
-                <a16:creationId xmlns:a16="http://schemas.microsoft.com/office/drawing/2014/main" id="{9E12239F-5F9B-1D22-1636-FBD447E17DC3}"/>
+                <a16:creationId xmlns:a16="http://schemas.microsoft.com/office/drawing/2014/main" id="{E219FBED-2F1A-E107-7238-972DF2A80D97}"/>
               </a:ext>
             </a:extLst>
           </p:cNvPr>
@@ -4481,7 +4511,7 @@
     </p:spTree>
     <p:extLst>
       <p:ext uri="{BB962C8B-B14F-4D97-AF65-F5344CB8AC3E}">
-        <p14:creationId xmlns:p14="http://schemas.microsoft.com/office/powerpoint/2010/main" val="1863395007"/>
+        <p14:creationId xmlns:p14="http://schemas.microsoft.com/office/powerpoint/2010/main" val="1561838123"/>
       </p:ext>
     </p:extLst>
   </p:cSld>
@@ -4513,7 +4543,7 @@
           <p:cNvPr id="2" name="제목 1">
             <a:extLst>
               <a:ext uri="{FF2B5EF4-FFF2-40B4-BE49-F238E27FC236}">
-                <a16:creationId xmlns:a16="http://schemas.microsoft.com/office/drawing/2014/main" id="{670DEDD6-BC34-52C6-25A9-24DD26A736A0}"/>
+                <a16:creationId xmlns:a16="http://schemas.microsoft.com/office/drawing/2014/main" id="{33211138-9519-6CAD-1576-9825CBE35950}"/>
               </a:ext>
             </a:extLst>
           </p:cNvPr>
@@ -4531,7 +4561,7 @@
           <a:p>
             <a:r>
               <a:rPr lang="en-US" altLang="ko-KR" dirty="0"/>
-              <a:t>4-way handshake, RST</a:t>
+              <a:t>3-way handshake</a:t>
             </a:r>
             <a:endParaRPr lang="ko-KR" altLang="en-US" dirty="0"/>
           </a:p>
@@ -4542,7 +4572,7 @@
           <p:cNvPr id="3" name="내용 개체 틀 2">
             <a:extLst>
               <a:ext uri="{FF2B5EF4-FFF2-40B4-BE49-F238E27FC236}">
-                <a16:creationId xmlns:a16="http://schemas.microsoft.com/office/drawing/2014/main" id="{22438CC3-7BB7-D691-7670-DEC124DCD6DB}"/>
+                <a16:creationId xmlns:a16="http://schemas.microsoft.com/office/drawing/2014/main" id="{9E12239F-5F9B-1D22-1636-FBD447E17DC3}"/>
               </a:ext>
             </a:extLst>
           </p:cNvPr>
@@ -4565,7 +4595,7 @@
     </p:spTree>
     <p:extLst>
       <p:ext uri="{BB962C8B-B14F-4D97-AF65-F5344CB8AC3E}">
-        <p14:creationId xmlns:p14="http://schemas.microsoft.com/office/powerpoint/2010/main" val="1933519205"/>
+        <p14:creationId xmlns:p14="http://schemas.microsoft.com/office/powerpoint/2010/main" val="1863395007"/>
       </p:ext>
     </p:extLst>
   </p:cSld>
@@ -4597,7 +4627,7 @@
           <p:cNvPr id="2" name="제목 1">
             <a:extLst>
               <a:ext uri="{FF2B5EF4-FFF2-40B4-BE49-F238E27FC236}">
-                <a16:creationId xmlns:a16="http://schemas.microsoft.com/office/drawing/2014/main" id="{F6968FF8-7B0F-3FBA-A4B6-C24AA00BBB6A}"/>
+                <a16:creationId xmlns:a16="http://schemas.microsoft.com/office/drawing/2014/main" id="{670DEDD6-BC34-52C6-25A9-24DD26A736A0}"/>
               </a:ext>
             </a:extLst>
           </p:cNvPr>
@@ -4615,7 +4645,7 @@
           <a:p>
             <a:r>
               <a:rPr lang="en-US" altLang="ko-KR" dirty="0"/>
-              <a:t>ARQ Protocol</a:t>
+              <a:t>4-way handshake, RST</a:t>
             </a:r>
             <a:endParaRPr lang="ko-KR" altLang="en-US" dirty="0"/>
           </a:p>
@@ -4626,7 +4656,7 @@
           <p:cNvPr id="3" name="내용 개체 틀 2">
             <a:extLst>
               <a:ext uri="{FF2B5EF4-FFF2-40B4-BE49-F238E27FC236}">
-                <a16:creationId xmlns:a16="http://schemas.microsoft.com/office/drawing/2014/main" id="{9E27041D-6E2D-DC48-84A1-DEF306E202DF}"/>
+                <a16:creationId xmlns:a16="http://schemas.microsoft.com/office/drawing/2014/main" id="{22438CC3-7BB7-D691-7670-DEC124DCD6DB}"/>
               </a:ext>
             </a:extLst>
           </p:cNvPr>
@@ -4649,7 +4679,7 @@
     </p:spTree>
     <p:extLst>
       <p:ext uri="{BB962C8B-B14F-4D97-AF65-F5344CB8AC3E}">
-        <p14:creationId xmlns:p14="http://schemas.microsoft.com/office/powerpoint/2010/main" val="1436977935"/>
+        <p14:creationId xmlns:p14="http://schemas.microsoft.com/office/powerpoint/2010/main" val="1933519205"/>
       </p:ext>
     </p:extLst>
   </p:cSld>
@@ -4678,18 +4708,18 @@
       </p:grpSpPr>
       <p:sp>
         <p:nvSpPr>
-          <p:cNvPr id="6" name="제목 5">
-            <a:extLst>
-              <a:ext uri="{FF2B5EF4-FFF2-40B4-BE49-F238E27FC236}">
-                <a16:creationId xmlns:a16="http://schemas.microsoft.com/office/drawing/2014/main" id="{F826D273-7332-66DA-9DCE-2EDFAAD4D461}"/>
-              </a:ext>
-            </a:extLst>
-          </p:cNvPr>
-          <p:cNvSpPr>
-            <a:spLocks noGrp="1"/>
-          </p:cNvSpPr>
-          <p:nvPr>
-            <p:ph type="ctrTitle"/>
+          <p:cNvPr id="2" name="제목 1">
+            <a:extLst>
+              <a:ext uri="{FF2B5EF4-FFF2-40B4-BE49-F238E27FC236}">
+                <a16:creationId xmlns:a16="http://schemas.microsoft.com/office/drawing/2014/main" id="{DA86CF70-640C-0AF8-B374-5CCA81374C4F}"/>
+              </a:ext>
+            </a:extLst>
+          </p:cNvPr>
+          <p:cNvSpPr>
+            <a:spLocks noGrp="1"/>
+          </p:cNvSpPr>
+          <p:nvPr>
+            <p:ph type="title"/>
           </p:nvPr>
         </p:nvSpPr>
         <p:spPr/>
@@ -4699,7 +4729,7 @@
           <a:p>
             <a:r>
               <a:rPr lang="en-US" altLang="ko-KR" dirty="0"/>
-              <a:t>Layer 3 </a:t>
+              <a:t>RTT</a:t>
             </a:r>
             <a:endParaRPr lang="ko-KR" altLang="en-US" dirty="0"/>
           </a:p>
@@ -4707,18 +4737,18 @@
       </p:sp>
       <p:sp>
         <p:nvSpPr>
-          <p:cNvPr id="7" name="부제목 6">
-            <a:extLst>
-              <a:ext uri="{FF2B5EF4-FFF2-40B4-BE49-F238E27FC236}">
-                <a16:creationId xmlns:a16="http://schemas.microsoft.com/office/drawing/2014/main" id="{4FD3139D-811E-04AA-6A66-753832B7229B}"/>
-              </a:ext>
-            </a:extLst>
-          </p:cNvPr>
-          <p:cNvSpPr>
-            <a:spLocks noGrp="1"/>
-          </p:cNvSpPr>
-          <p:nvPr>
-            <p:ph type="subTitle" idx="1"/>
+          <p:cNvPr id="3" name="내용 개체 틀 2">
+            <a:extLst>
+              <a:ext uri="{FF2B5EF4-FFF2-40B4-BE49-F238E27FC236}">
+                <a16:creationId xmlns:a16="http://schemas.microsoft.com/office/drawing/2014/main" id="{C76FA399-197C-29B5-E4EB-A09EE65D7C02}"/>
+              </a:ext>
+            </a:extLst>
+          </p:cNvPr>
+          <p:cNvSpPr>
+            <a:spLocks noGrp="1"/>
+          </p:cNvSpPr>
+          <p:nvPr>
+            <p:ph idx="1"/>
           </p:nvPr>
         </p:nvSpPr>
         <p:spPr/>
@@ -4726,28 +4756,14 @@
           <a:bodyPr/>
           <a:lstStyle/>
           <a:p>
-            <a:r>
-              <a:rPr lang="ko-KR" altLang="en-US" dirty="0"/>
-              <a:t>네트워크 계층</a:t>
-            </a:r>
-            <a:br>
-              <a:rPr lang="en-US" altLang="ko-KR" dirty="0"/>
-            </a:br>
-            <a:r>
-              <a:rPr lang="en-US" altLang="ko-KR" dirty="0"/>
-              <a:t>(Network Layer)</a:t>
-            </a:r>
-            <a:endParaRPr lang="ko-KR" altLang="en-US" dirty="0"/>
-          </a:p>
-          <a:p>
-            <a:endParaRPr lang="ko-KR" altLang="en-US" dirty="0"/>
+            <a:endParaRPr lang="ko-KR" altLang="en-US"/>
           </a:p>
         </p:txBody>
       </p:sp>
     </p:spTree>
     <p:extLst>
       <p:ext uri="{BB962C8B-B14F-4D97-AF65-F5344CB8AC3E}">
-        <p14:creationId xmlns:p14="http://schemas.microsoft.com/office/powerpoint/2010/main" val="2509722968"/>
+        <p14:creationId xmlns:p14="http://schemas.microsoft.com/office/powerpoint/2010/main" val="254594952"/>
       </p:ext>
     </p:extLst>
   </p:cSld>
@@ -4776,18 +4792,18 @@
       </p:grpSpPr>
       <p:sp>
         <p:nvSpPr>
-          <p:cNvPr id="6" name="제목 5">
-            <a:extLst>
-              <a:ext uri="{FF2B5EF4-FFF2-40B4-BE49-F238E27FC236}">
-                <a16:creationId xmlns:a16="http://schemas.microsoft.com/office/drawing/2014/main" id="{F826D273-7332-66DA-9DCE-2EDFAAD4D461}"/>
-              </a:ext>
-            </a:extLst>
-          </p:cNvPr>
-          <p:cNvSpPr>
-            <a:spLocks noGrp="1"/>
-          </p:cNvSpPr>
-          <p:nvPr>
-            <p:ph type="ctrTitle"/>
+          <p:cNvPr id="2" name="제목 1">
+            <a:extLst>
+              <a:ext uri="{FF2B5EF4-FFF2-40B4-BE49-F238E27FC236}">
+                <a16:creationId xmlns:a16="http://schemas.microsoft.com/office/drawing/2014/main" id="{9683C281-FEF9-3C44-E7C0-5C739AD4BFC0}"/>
+              </a:ext>
+            </a:extLst>
+          </p:cNvPr>
+          <p:cNvSpPr>
+            <a:spLocks noGrp="1"/>
+          </p:cNvSpPr>
+          <p:nvPr>
+            <p:ph type="title"/>
           </p:nvPr>
         </p:nvSpPr>
         <p:spPr/>
@@ -4796,27 +4812,26 @@
           <a:lstStyle/>
           <a:p>
             <a:r>
-              <a:rPr lang="en-US" altLang="ko-KR" dirty="0"/>
-              <a:t>Layer 2 </a:t>
-            </a:r>
-            <a:endParaRPr lang="ko-KR" altLang="en-US" dirty="0"/>
-          </a:p>
-        </p:txBody>
-      </p:sp>
-      <p:sp>
-        <p:nvSpPr>
-          <p:cNvPr id="7" name="부제목 6">
-            <a:extLst>
-              <a:ext uri="{FF2B5EF4-FFF2-40B4-BE49-F238E27FC236}">
-                <a16:creationId xmlns:a16="http://schemas.microsoft.com/office/drawing/2014/main" id="{4FD3139D-811E-04AA-6A66-753832B7229B}"/>
-              </a:ext>
-            </a:extLst>
-          </p:cNvPr>
-          <p:cNvSpPr>
-            <a:spLocks noGrp="1"/>
-          </p:cNvSpPr>
-          <p:nvPr>
-            <p:ph type="subTitle" idx="1"/>
+              <a:rPr lang="ko-KR" altLang="en-US" dirty="0"/>
+              <a:t>흐름제어</a:t>
+            </a:r>
+          </a:p>
+        </p:txBody>
+      </p:sp>
+      <p:sp>
+        <p:nvSpPr>
+          <p:cNvPr id="3" name="내용 개체 틀 2">
+            <a:extLst>
+              <a:ext uri="{FF2B5EF4-FFF2-40B4-BE49-F238E27FC236}">
+                <a16:creationId xmlns:a16="http://schemas.microsoft.com/office/drawing/2014/main" id="{C2A9C482-02F9-76FC-47DC-F5E54241D9EF}"/>
+              </a:ext>
+            </a:extLst>
+          </p:cNvPr>
+          <p:cNvSpPr>
+            <a:spLocks noGrp="1"/>
+          </p:cNvSpPr>
+          <p:nvPr>
+            <p:ph idx="1"/>
           </p:nvPr>
         </p:nvSpPr>
         <p:spPr/>
@@ -4824,36 +4839,14 @@
           <a:bodyPr/>
           <a:lstStyle/>
           <a:p>
-            <a:r>
-              <a:rPr lang="ko-KR" altLang="en-US" dirty="0"/>
-              <a:t>링크 계층</a:t>
-            </a:r>
-            <a:br>
-              <a:rPr lang="en-US" altLang="ko-KR" dirty="0"/>
-            </a:br>
-            <a:r>
-              <a:rPr lang="en-US" altLang="ko-KR" dirty="0"/>
-              <a:t>(</a:t>
-            </a:r>
-            <a:r>
-              <a:rPr lang="en-US" altLang="ko-KR" dirty="0" err="1"/>
-              <a:t>DataLink</a:t>
-            </a:r>
-            <a:r>
-              <a:rPr lang="en-US" altLang="ko-KR" dirty="0"/>
-              <a:t> Layer)</a:t>
-            </a:r>
-            <a:endParaRPr lang="ko-KR" altLang="en-US" dirty="0"/>
-          </a:p>
-          <a:p>
-            <a:endParaRPr lang="ko-KR" altLang="en-US" dirty="0"/>
+            <a:endParaRPr lang="ko-KR" altLang="en-US"/>
           </a:p>
         </p:txBody>
       </p:sp>
     </p:spTree>
     <p:extLst>
       <p:ext uri="{BB962C8B-B14F-4D97-AF65-F5344CB8AC3E}">
-        <p14:creationId xmlns:p14="http://schemas.microsoft.com/office/powerpoint/2010/main" val="2005904950"/>
+        <p14:creationId xmlns:p14="http://schemas.microsoft.com/office/powerpoint/2010/main" val="682097685"/>
       </p:ext>
     </p:extLst>
   </p:cSld>
@@ -4882,6 +4875,173 @@
       </p:grpSpPr>
       <p:sp>
         <p:nvSpPr>
+          <p:cNvPr id="2" name="제목 1">
+            <a:extLst>
+              <a:ext uri="{FF2B5EF4-FFF2-40B4-BE49-F238E27FC236}">
+                <a16:creationId xmlns:a16="http://schemas.microsoft.com/office/drawing/2014/main" id="{9B83E513-7F3A-9608-837C-31CEDFC58E8F}"/>
+              </a:ext>
+            </a:extLst>
+          </p:cNvPr>
+          <p:cNvSpPr>
+            <a:spLocks noGrp="1"/>
+          </p:cNvSpPr>
+          <p:nvPr>
+            <p:ph type="title"/>
+          </p:nvPr>
+        </p:nvSpPr>
+        <p:spPr/>
+        <p:txBody>
+          <a:bodyPr/>
+          <a:lstStyle/>
+          <a:p>
+            <a:r>
+              <a:rPr lang="ko-KR" altLang="en-US" dirty="0"/>
+              <a:t>혼잡제어</a:t>
+            </a:r>
+          </a:p>
+        </p:txBody>
+      </p:sp>
+      <p:sp>
+        <p:nvSpPr>
+          <p:cNvPr id="3" name="내용 개체 틀 2">
+            <a:extLst>
+              <a:ext uri="{FF2B5EF4-FFF2-40B4-BE49-F238E27FC236}">
+                <a16:creationId xmlns:a16="http://schemas.microsoft.com/office/drawing/2014/main" id="{56DA14A8-EEA4-9CDD-B7BA-9D06E8A4FC93}"/>
+              </a:ext>
+            </a:extLst>
+          </p:cNvPr>
+          <p:cNvSpPr>
+            <a:spLocks noGrp="1"/>
+          </p:cNvSpPr>
+          <p:nvPr>
+            <p:ph idx="1"/>
+          </p:nvPr>
+        </p:nvSpPr>
+        <p:spPr/>
+        <p:txBody>
+          <a:bodyPr/>
+          <a:lstStyle/>
+          <a:p>
+            <a:endParaRPr lang="ko-KR" altLang="en-US"/>
+          </a:p>
+        </p:txBody>
+      </p:sp>
+    </p:spTree>
+    <p:extLst>
+      <p:ext uri="{BB962C8B-B14F-4D97-AF65-F5344CB8AC3E}">
+        <p14:creationId xmlns:p14="http://schemas.microsoft.com/office/powerpoint/2010/main" val="300377989"/>
+      </p:ext>
+    </p:extLst>
+  </p:cSld>
+  <p:clrMapOvr>
+    <a:masterClrMapping/>
+  </p:clrMapOvr>
+</p:sld>
+</file>
+
+<file path=ppt/slides/slide16.xml><?xml version="1.0" encoding="utf-8"?>
+<p:sld xmlns:a="http://schemas.openxmlformats.org/drawingml/2006/main" xmlns:r="http://schemas.openxmlformats.org/officeDocument/2006/relationships" xmlns:p="http://schemas.openxmlformats.org/presentationml/2006/main">
+  <p:cSld>
+    <p:spTree>
+      <p:nvGrpSpPr>
+        <p:cNvPr id="1" name=""/>
+        <p:cNvGrpSpPr/>
+        <p:nvPr/>
+      </p:nvGrpSpPr>
+      <p:grpSpPr>
+        <a:xfrm>
+          <a:off x="0" y="0"/>
+          <a:ext cx="0" cy="0"/>
+          <a:chOff x="0" y="0"/>
+          <a:chExt cx="0" cy="0"/>
+        </a:xfrm>
+      </p:grpSpPr>
+      <p:sp>
+        <p:nvSpPr>
+          <p:cNvPr id="2" name="제목 1">
+            <a:extLst>
+              <a:ext uri="{FF2B5EF4-FFF2-40B4-BE49-F238E27FC236}">
+                <a16:creationId xmlns:a16="http://schemas.microsoft.com/office/drawing/2014/main" id="{F6968FF8-7B0F-3FBA-A4B6-C24AA00BBB6A}"/>
+              </a:ext>
+            </a:extLst>
+          </p:cNvPr>
+          <p:cNvSpPr>
+            <a:spLocks noGrp="1"/>
+          </p:cNvSpPr>
+          <p:nvPr>
+            <p:ph type="title"/>
+          </p:nvPr>
+        </p:nvSpPr>
+        <p:spPr/>
+        <p:txBody>
+          <a:bodyPr/>
+          <a:lstStyle/>
+          <a:p>
+            <a:r>
+              <a:rPr lang="en-US" altLang="ko-KR" dirty="0"/>
+              <a:t>ARQ Protocol</a:t>
+            </a:r>
+            <a:endParaRPr lang="ko-KR" altLang="en-US" dirty="0"/>
+          </a:p>
+        </p:txBody>
+      </p:sp>
+      <p:sp>
+        <p:nvSpPr>
+          <p:cNvPr id="3" name="내용 개체 틀 2">
+            <a:extLst>
+              <a:ext uri="{FF2B5EF4-FFF2-40B4-BE49-F238E27FC236}">
+                <a16:creationId xmlns:a16="http://schemas.microsoft.com/office/drawing/2014/main" id="{9E27041D-6E2D-DC48-84A1-DEF306E202DF}"/>
+              </a:ext>
+            </a:extLst>
+          </p:cNvPr>
+          <p:cNvSpPr>
+            <a:spLocks noGrp="1"/>
+          </p:cNvSpPr>
+          <p:nvPr>
+            <p:ph idx="1"/>
+          </p:nvPr>
+        </p:nvSpPr>
+        <p:spPr/>
+        <p:txBody>
+          <a:bodyPr/>
+          <a:lstStyle/>
+          <a:p>
+            <a:endParaRPr lang="ko-KR" altLang="en-US"/>
+          </a:p>
+        </p:txBody>
+      </p:sp>
+    </p:spTree>
+    <p:extLst>
+      <p:ext uri="{BB962C8B-B14F-4D97-AF65-F5344CB8AC3E}">
+        <p14:creationId xmlns:p14="http://schemas.microsoft.com/office/powerpoint/2010/main" val="1436977935"/>
+      </p:ext>
+    </p:extLst>
+  </p:cSld>
+  <p:clrMapOvr>
+    <a:masterClrMapping/>
+  </p:clrMapOvr>
+</p:sld>
+</file>
+
+<file path=ppt/slides/slide17.xml><?xml version="1.0" encoding="utf-8"?>
+<p:sld xmlns:a="http://schemas.openxmlformats.org/drawingml/2006/main" xmlns:r="http://schemas.openxmlformats.org/officeDocument/2006/relationships" xmlns:p="http://schemas.openxmlformats.org/presentationml/2006/main">
+  <p:cSld>
+    <p:spTree>
+      <p:nvGrpSpPr>
+        <p:cNvPr id="1" name=""/>
+        <p:cNvGrpSpPr/>
+        <p:nvPr/>
+      </p:nvGrpSpPr>
+      <p:grpSpPr>
+        <a:xfrm>
+          <a:off x="0" y="0"/>
+          <a:ext cx="0" cy="0"/>
+          <a:chOff x="0" y="0"/>
+          <a:chExt cx="0" cy="0"/>
+        </a:xfrm>
+      </p:grpSpPr>
+      <p:sp>
+        <p:nvSpPr>
           <p:cNvPr id="6" name="제목 5">
             <a:extLst>
               <a:ext uri="{FF2B5EF4-FFF2-40B4-BE49-F238E27FC236}">
@@ -4903,7 +5063,7 @@
           <a:p>
             <a:r>
               <a:rPr lang="en-US" altLang="ko-KR" dirty="0"/>
-              <a:t>Layer 1 </a:t>
+              <a:t>Layer 3 </a:t>
             </a:r>
             <a:endParaRPr lang="ko-KR" altLang="en-US" dirty="0"/>
           </a:p>
@@ -4932,14 +5092,14 @@
           <a:p>
             <a:r>
               <a:rPr lang="ko-KR" altLang="en-US" dirty="0"/>
-              <a:t>물리 계층</a:t>
+              <a:t>네트워크 계층</a:t>
             </a:r>
             <a:br>
               <a:rPr lang="en-US" altLang="ko-KR" dirty="0"/>
             </a:br>
             <a:r>
               <a:rPr lang="en-US" altLang="ko-KR" dirty="0"/>
-              <a:t>(Physical Layer)</a:t>
+              <a:t>(Network Layer)</a:t>
             </a:r>
             <a:endParaRPr lang="ko-KR" altLang="en-US" dirty="0"/>
           </a:p>
@@ -4951,7 +5111,175 @@
     </p:spTree>
     <p:extLst>
       <p:ext uri="{BB962C8B-B14F-4D97-AF65-F5344CB8AC3E}">
-        <p14:creationId xmlns:p14="http://schemas.microsoft.com/office/powerpoint/2010/main" val="2904713976"/>
+        <p14:creationId xmlns:p14="http://schemas.microsoft.com/office/powerpoint/2010/main" val="2509722968"/>
+      </p:ext>
+    </p:extLst>
+  </p:cSld>
+  <p:clrMapOvr>
+    <a:masterClrMapping/>
+  </p:clrMapOvr>
+</p:sld>
+</file>
+
+<file path=ppt/slides/slide18.xml><?xml version="1.0" encoding="utf-8"?>
+<p:sld xmlns:a="http://schemas.openxmlformats.org/drawingml/2006/main" xmlns:r="http://schemas.openxmlformats.org/officeDocument/2006/relationships" xmlns:p="http://schemas.openxmlformats.org/presentationml/2006/main">
+  <p:cSld>
+    <p:spTree>
+      <p:nvGrpSpPr>
+        <p:cNvPr id="1" name=""/>
+        <p:cNvGrpSpPr/>
+        <p:nvPr/>
+      </p:nvGrpSpPr>
+      <p:grpSpPr>
+        <a:xfrm>
+          <a:off x="0" y="0"/>
+          <a:ext cx="0" cy="0"/>
+          <a:chOff x="0" y="0"/>
+          <a:chExt cx="0" cy="0"/>
+        </a:xfrm>
+      </p:grpSpPr>
+      <p:sp>
+        <p:nvSpPr>
+          <p:cNvPr id="2" name="제목 1">
+            <a:extLst>
+              <a:ext uri="{FF2B5EF4-FFF2-40B4-BE49-F238E27FC236}">
+                <a16:creationId xmlns:a16="http://schemas.microsoft.com/office/drawing/2014/main" id="{D989DB82-9F96-A5EB-55B4-642F1A7B21B5}"/>
+              </a:ext>
+            </a:extLst>
+          </p:cNvPr>
+          <p:cNvSpPr>
+            <a:spLocks noGrp="1"/>
+          </p:cNvSpPr>
+          <p:nvPr>
+            <p:ph type="title"/>
+          </p:nvPr>
+        </p:nvSpPr>
+        <p:spPr/>
+        <p:txBody>
+          <a:bodyPr/>
+          <a:lstStyle/>
+          <a:p>
+            <a:r>
+              <a:rPr lang="en-US" altLang="ko-KR" dirty="0"/>
+              <a:t>IP Datagram</a:t>
+            </a:r>
+            <a:endParaRPr lang="ko-KR" altLang="en-US" dirty="0"/>
+          </a:p>
+        </p:txBody>
+      </p:sp>
+      <p:sp>
+        <p:nvSpPr>
+          <p:cNvPr id="3" name="내용 개체 틀 2">
+            <a:extLst>
+              <a:ext uri="{FF2B5EF4-FFF2-40B4-BE49-F238E27FC236}">
+                <a16:creationId xmlns:a16="http://schemas.microsoft.com/office/drawing/2014/main" id="{D2291C35-F0C5-F9B5-6039-B7B4AD94D60D}"/>
+              </a:ext>
+            </a:extLst>
+          </p:cNvPr>
+          <p:cNvSpPr>
+            <a:spLocks noGrp="1"/>
+          </p:cNvSpPr>
+          <p:nvPr>
+            <p:ph idx="1"/>
+          </p:nvPr>
+        </p:nvSpPr>
+        <p:spPr/>
+        <p:txBody>
+          <a:bodyPr/>
+          <a:lstStyle/>
+          <a:p>
+            <a:endParaRPr lang="ko-KR" altLang="en-US"/>
+          </a:p>
+        </p:txBody>
+      </p:sp>
+    </p:spTree>
+    <p:extLst>
+      <p:ext uri="{BB962C8B-B14F-4D97-AF65-F5344CB8AC3E}">
+        <p14:creationId xmlns:p14="http://schemas.microsoft.com/office/powerpoint/2010/main" val="3183895354"/>
+      </p:ext>
+    </p:extLst>
+  </p:cSld>
+  <p:clrMapOvr>
+    <a:masterClrMapping/>
+  </p:clrMapOvr>
+</p:sld>
+</file>
+
+<file path=ppt/slides/slide19.xml><?xml version="1.0" encoding="utf-8"?>
+<p:sld xmlns:a="http://schemas.openxmlformats.org/drawingml/2006/main" xmlns:r="http://schemas.openxmlformats.org/officeDocument/2006/relationships" xmlns:p="http://schemas.openxmlformats.org/presentationml/2006/main">
+  <p:cSld>
+    <p:spTree>
+      <p:nvGrpSpPr>
+        <p:cNvPr id="1" name=""/>
+        <p:cNvGrpSpPr/>
+        <p:nvPr/>
+      </p:nvGrpSpPr>
+      <p:grpSpPr>
+        <a:xfrm>
+          <a:off x="0" y="0"/>
+          <a:ext cx="0" cy="0"/>
+          <a:chOff x="0" y="0"/>
+          <a:chExt cx="0" cy="0"/>
+        </a:xfrm>
+      </p:grpSpPr>
+      <p:sp>
+        <p:nvSpPr>
+          <p:cNvPr id="2" name="제목 1">
+            <a:extLst>
+              <a:ext uri="{FF2B5EF4-FFF2-40B4-BE49-F238E27FC236}">
+                <a16:creationId xmlns:a16="http://schemas.microsoft.com/office/drawing/2014/main" id="{0E181B45-9E1F-EAE1-462A-3DF457D31B9A}"/>
+              </a:ext>
+            </a:extLst>
+          </p:cNvPr>
+          <p:cNvSpPr>
+            <a:spLocks noGrp="1"/>
+          </p:cNvSpPr>
+          <p:nvPr>
+            <p:ph type="title"/>
+          </p:nvPr>
+        </p:nvSpPr>
+        <p:spPr/>
+        <p:txBody>
+          <a:bodyPr/>
+          <a:lstStyle/>
+          <a:p>
+            <a:r>
+              <a:rPr lang="en-US" altLang="ko-KR" dirty="0"/>
+              <a:t>IPv4</a:t>
+            </a:r>
+            <a:endParaRPr lang="ko-KR" altLang="en-US" dirty="0"/>
+          </a:p>
+        </p:txBody>
+      </p:sp>
+      <p:sp>
+        <p:nvSpPr>
+          <p:cNvPr id="3" name="내용 개체 틀 2">
+            <a:extLst>
+              <a:ext uri="{FF2B5EF4-FFF2-40B4-BE49-F238E27FC236}">
+                <a16:creationId xmlns:a16="http://schemas.microsoft.com/office/drawing/2014/main" id="{8D5DE25F-1285-0A89-FB09-95AF77B17ADB}"/>
+              </a:ext>
+            </a:extLst>
+          </p:cNvPr>
+          <p:cNvSpPr>
+            <a:spLocks noGrp="1"/>
+          </p:cNvSpPr>
+          <p:nvPr>
+            <p:ph idx="1"/>
+          </p:nvPr>
+        </p:nvSpPr>
+        <p:spPr/>
+        <p:txBody>
+          <a:bodyPr/>
+          <a:lstStyle/>
+          <a:p>
+            <a:endParaRPr lang="ko-KR" altLang="en-US"/>
+          </a:p>
+        </p:txBody>
+      </p:sp>
+    </p:spTree>
+    <p:extLst>
+      <p:ext uri="{BB962C8B-B14F-4D97-AF65-F5344CB8AC3E}">
+        <p14:creationId xmlns:p14="http://schemas.microsoft.com/office/powerpoint/2010/main" val="3994509119"/>
       </p:ext>
     </p:extLst>
   </p:cSld>
@@ -5039,6 +5367,846 @@
     <p:extLst>
       <p:ext uri="{BB962C8B-B14F-4D97-AF65-F5344CB8AC3E}">
         <p14:creationId xmlns:p14="http://schemas.microsoft.com/office/powerpoint/2010/main" val="1891347161"/>
+      </p:ext>
+    </p:extLst>
+  </p:cSld>
+  <p:clrMapOvr>
+    <a:masterClrMapping/>
+  </p:clrMapOvr>
+</p:sld>
+</file>
+
+<file path=ppt/slides/slide20.xml><?xml version="1.0" encoding="utf-8"?>
+<p:sld xmlns:a="http://schemas.openxmlformats.org/drawingml/2006/main" xmlns:r="http://schemas.openxmlformats.org/officeDocument/2006/relationships" xmlns:p="http://schemas.openxmlformats.org/presentationml/2006/main">
+  <p:cSld>
+    <p:spTree>
+      <p:nvGrpSpPr>
+        <p:cNvPr id="1" name=""/>
+        <p:cNvGrpSpPr/>
+        <p:nvPr/>
+      </p:nvGrpSpPr>
+      <p:grpSpPr>
+        <a:xfrm>
+          <a:off x="0" y="0"/>
+          <a:ext cx="0" cy="0"/>
+          <a:chOff x="0" y="0"/>
+          <a:chExt cx="0" cy="0"/>
+        </a:xfrm>
+      </p:grpSpPr>
+      <p:sp>
+        <p:nvSpPr>
+          <p:cNvPr id="2" name="제목 1">
+            <a:extLst>
+              <a:ext uri="{FF2B5EF4-FFF2-40B4-BE49-F238E27FC236}">
+                <a16:creationId xmlns:a16="http://schemas.microsoft.com/office/drawing/2014/main" id="{37D4A492-B248-59C9-34A0-ACB9501F4BD9}"/>
+              </a:ext>
+            </a:extLst>
+          </p:cNvPr>
+          <p:cNvSpPr>
+            <a:spLocks noGrp="1"/>
+          </p:cNvSpPr>
+          <p:nvPr>
+            <p:ph type="title"/>
+          </p:nvPr>
+        </p:nvSpPr>
+        <p:spPr/>
+        <p:txBody>
+          <a:bodyPr/>
+          <a:lstStyle/>
+          <a:p>
+            <a:r>
+              <a:rPr lang="en-US" altLang="ko-KR" dirty="0"/>
+              <a:t>Subnet, Classful, CIDR</a:t>
+            </a:r>
+            <a:endParaRPr lang="ko-KR" altLang="en-US" dirty="0"/>
+          </a:p>
+        </p:txBody>
+      </p:sp>
+      <p:sp>
+        <p:nvSpPr>
+          <p:cNvPr id="3" name="내용 개체 틀 2">
+            <a:extLst>
+              <a:ext uri="{FF2B5EF4-FFF2-40B4-BE49-F238E27FC236}">
+                <a16:creationId xmlns:a16="http://schemas.microsoft.com/office/drawing/2014/main" id="{EB191E59-8D95-1147-96A8-3307FDED0792}"/>
+              </a:ext>
+            </a:extLst>
+          </p:cNvPr>
+          <p:cNvSpPr>
+            <a:spLocks noGrp="1"/>
+          </p:cNvSpPr>
+          <p:nvPr>
+            <p:ph idx="1"/>
+          </p:nvPr>
+        </p:nvSpPr>
+        <p:spPr/>
+        <p:txBody>
+          <a:bodyPr/>
+          <a:lstStyle/>
+          <a:p>
+            <a:endParaRPr lang="ko-KR" altLang="en-US"/>
+          </a:p>
+        </p:txBody>
+      </p:sp>
+    </p:spTree>
+    <p:extLst>
+      <p:ext uri="{BB962C8B-B14F-4D97-AF65-F5344CB8AC3E}">
+        <p14:creationId xmlns:p14="http://schemas.microsoft.com/office/powerpoint/2010/main" val="4095649906"/>
+      </p:ext>
+    </p:extLst>
+  </p:cSld>
+  <p:clrMapOvr>
+    <a:masterClrMapping/>
+  </p:clrMapOvr>
+</p:sld>
+</file>
+
+<file path=ppt/slides/slide21.xml><?xml version="1.0" encoding="utf-8"?>
+<p:sld xmlns:a="http://schemas.openxmlformats.org/drawingml/2006/main" xmlns:r="http://schemas.openxmlformats.org/officeDocument/2006/relationships" xmlns:p="http://schemas.openxmlformats.org/presentationml/2006/main">
+  <p:cSld>
+    <p:spTree>
+      <p:nvGrpSpPr>
+        <p:cNvPr id="1" name=""/>
+        <p:cNvGrpSpPr/>
+        <p:nvPr/>
+      </p:nvGrpSpPr>
+      <p:grpSpPr>
+        <a:xfrm>
+          <a:off x="0" y="0"/>
+          <a:ext cx="0" cy="0"/>
+          <a:chOff x="0" y="0"/>
+          <a:chExt cx="0" cy="0"/>
+        </a:xfrm>
+      </p:grpSpPr>
+      <p:sp>
+        <p:nvSpPr>
+          <p:cNvPr id="2" name="제목 1">
+            <a:extLst>
+              <a:ext uri="{FF2B5EF4-FFF2-40B4-BE49-F238E27FC236}">
+                <a16:creationId xmlns:a16="http://schemas.microsoft.com/office/drawing/2014/main" id="{ACD3445E-75EE-3CBD-8355-42F4C990B04E}"/>
+              </a:ext>
+            </a:extLst>
+          </p:cNvPr>
+          <p:cNvSpPr>
+            <a:spLocks noGrp="1"/>
+          </p:cNvSpPr>
+          <p:nvPr>
+            <p:ph type="title"/>
+          </p:nvPr>
+        </p:nvSpPr>
+        <p:spPr/>
+        <p:txBody>
+          <a:bodyPr/>
+          <a:lstStyle/>
+          <a:p>
+            <a:r>
+              <a:rPr lang="en-US" altLang="ko-KR" dirty="0"/>
+              <a:t>DHCP</a:t>
+            </a:r>
+            <a:endParaRPr lang="ko-KR" altLang="en-US" dirty="0"/>
+          </a:p>
+        </p:txBody>
+      </p:sp>
+      <p:sp>
+        <p:nvSpPr>
+          <p:cNvPr id="3" name="내용 개체 틀 2">
+            <a:extLst>
+              <a:ext uri="{FF2B5EF4-FFF2-40B4-BE49-F238E27FC236}">
+                <a16:creationId xmlns:a16="http://schemas.microsoft.com/office/drawing/2014/main" id="{1736D7A4-70CF-B102-D6E2-DCBF1B7C2735}"/>
+              </a:ext>
+            </a:extLst>
+          </p:cNvPr>
+          <p:cNvSpPr>
+            <a:spLocks noGrp="1"/>
+          </p:cNvSpPr>
+          <p:nvPr>
+            <p:ph idx="1"/>
+          </p:nvPr>
+        </p:nvSpPr>
+        <p:spPr/>
+        <p:txBody>
+          <a:bodyPr/>
+          <a:lstStyle/>
+          <a:p>
+            <a:endParaRPr lang="ko-KR" altLang="en-US"/>
+          </a:p>
+        </p:txBody>
+      </p:sp>
+    </p:spTree>
+    <p:extLst>
+      <p:ext uri="{BB962C8B-B14F-4D97-AF65-F5344CB8AC3E}">
+        <p14:creationId xmlns:p14="http://schemas.microsoft.com/office/powerpoint/2010/main" val="2020347262"/>
+      </p:ext>
+    </p:extLst>
+  </p:cSld>
+  <p:clrMapOvr>
+    <a:masterClrMapping/>
+  </p:clrMapOvr>
+</p:sld>
+</file>
+
+<file path=ppt/slides/slide22.xml><?xml version="1.0" encoding="utf-8"?>
+<p:sld xmlns:a="http://schemas.openxmlformats.org/drawingml/2006/main" xmlns:r="http://schemas.openxmlformats.org/officeDocument/2006/relationships" xmlns:p="http://schemas.openxmlformats.org/presentationml/2006/main">
+  <p:cSld>
+    <p:spTree>
+      <p:nvGrpSpPr>
+        <p:cNvPr id="1" name=""/>
+        <p:cNvGrpSpPr/>
+        <p:nvPr/>
+      </p:nvGrpSpPr>
+      <p:grpSpPr>
+        <a:xfrm>
+          <a:off x="0" y="0"/>
+          <a:ext cx="0" cy="0"/>
+          <a:chOff x="0" y="0"/>
+          <a:chExt cx="0" cy="0"/>
+        </a:xfrm>
+      </p:grpSpPr>
+      <p:sp>
+        <p:nvSpPr>
+          <p:cNvPr id="2" name="제목 1">
+            <a:extLst>
+              <a:ext uri="{FF2B5EF4-FFF2-40B4-BE49-F238E27FC236}">
+                <a16:creationId xmlns:a16="http://schemas.microsoft.com/office/drawing/2014/main" id="{069D763A-9085-A4A1-6C62-727F51E9678A}"/>
+              </a:ext>
+            </a:extLst>
+          </p:cNvPr>
+          <p:cNvSpPr>
+            <a:spLocks noGrp="1"/>
+          </p:cNvSpPr>
+          <p:nvPr>
+            <p:ph type="title"/>
+          </p:nvPr>
+        </p:nvSpPr>
+        <p:spPr/>
+        <p:txBody>
+          <a:bodyPr/>
+          <a:lstStyle/>
+          <a:p>
+            <a:r>
+              <a:rPr lang="en-US" altLang="ko-KR" dirty="0"/>
+              <a:t>NAT</a:t>
+            </a:r>
+            <a:endParaRPr lang="ko-KR" altLang="en-US" dirty="0"/>
+          </a:p>
+        </p:txBody>
+      </p:sp>
+      <p:sp>
+        <p:nvSpPr>
+          <p:cNvPr id="3" name="내용 개체 틀 2">
+            <a:extLst>
+              <a:ext uri="{FF2B5EF4-FFF2-40B4-BE49-F238E27FC236}">
+                <a16:creationId xmlns:a16="http://schemas.microsoft.com/office/drawing/2014/main" id="{DA3747CD-65C3-BA21-E67F-4929F34BD2EF}"/>
+              </a:ext>
+            </a:extLst>
+          </p:cNvPr>
+          <p:cNvSpPr>
+            <a:spLocks noGrp="1"/>
+          </p:cNvSpPr>
+          <p:nvPr>
+            <p:ph idx="1"/>
+          </p:nvPr>
+        </p:nvSpPr>
+        <p:spPr/>
+        <p:txBody>
+          <a:bodyPr/>
+          <a:lstStyle/>
+          <a:p>
+            <a:endParaRPr lang="ko-KR" altLang="en-US"/>
+          </a:p>
+        </p:txBody>
+      </p:sp>
+    </p:spTree>
+    <p:extLst>
+      <p:ext uri="{BB962C8B-B14F-4D97-AF65-F5344CB8AC3E}">
+        <p14:creationId xmlns:p14="http://schemas.microsoft.com/office/powerpoint/2010/main" val="3674313477"/>
+      </p:ext>
+    </p:extLst>
+  </p:cSld>
+  <p:clrMapOvr>
+    <a:masterClrMapping/>
+  </p:clrMapOvr>
+</p:sld>
+</file>
+
+<file path=ppt/slides/slide23.xml><?xml version="1.0" encoding="utf-8"?>
+<p:sld xmlns:a="http://schemas.openxmlformats.org/drawingml/2006/main" xmlns:r="http://schemas.openxmlformats.org/officeDocument/2006/relationships" xmlns:p="http://schemas.openxmlformats.org/presentationml/2006/main">
+  <p:cSld>
+    <p:spTree>
+      <p:nvGrpSpPr>
+        <p:cNvPr id="1" name=""/>
+        <p:cNvGrpSpPr/>
+        <p:nvPr/>
+      </p:nvGrpSpPr>
+      <p:grpSpPr>
+        <a:xfrm>
+          <a:off x="0" y="0"/>
+          <a:ext cx="0" cy="0"/>
+          <a:chOff x="0" y="0"/>
+          <a:chExt cx="0" cy="0"/>
+        </a:xfrm>
+      </p:grpSpPr>
+      <p:sp>
+        <p:nvSpPr>
+          <p:cNvPr id="2" name="제목 1">
+            <a:extLst>
+              <a:ext uri="{FF2B5EF4-FFF2-40B4-BE49-F238E27FC236}">
+                <a16:creationId xmlns:a16="http://schemas.microsoft.com/office/drawing/2014/main" id="{ED615AC7-2BA4-8056-6389-D398FFF072C0}"/>
+              </a:ext>
+            </a:extLst>
+          </p:cNvPr>
+          <p:cNvSpPr>
+            <a:spLocks noGrp="1"/>
+          </p:cNvSpPr>
+          <p:nvPr>
+            <p:ph type="title"/>
+          </p:nvPr>
+        </p:nvSpPr>
+        <p:spPr/>
+        <p:txBody>
+          <a:bodyPr/>
+          <a:lstStyle/>
+          <a:p>
+            <a:r>
+              <a:rPr lang="en-US" altLang="ko-KR" dirty="0"/>
+              <a:t>NAPT, STUN, TURN</a:t>
+            </a:r>
+            <a:endParaRPr lang="ko-KR" altLang="en-US" dirty="0"/>
+          </a:p>
+        </p:txBody>
+      </p:sp>
+      <p:sp>
+        <p:nvSpPr>
+          <p:cNvPr id="3" name="내용 개체 틀 2">
+            <a:extLst>
+              <a:ext uri="{FF2B5EF4-FFF2-40B4-BE49-F238E27FC236}">
+                <a16:creationId xmlns:a16="http://schemas.microsoft.com/office/drawing/2014/main" id="{D9648417-8B24-D566-F96B-84D4FC787A1C}"/>
+              </a:ext>
+            </a:extLst>
+          </p:cNvPr>
+          <p:cNvSpPr>
+            <a:spLocks noGrp="1"/>
+          </p:cNvSpPr>
+          <p:nvPr>
+            <p:ph idx="1"/>
+          </p:nvPr>
+        </p:nvSpPr>
+        <p:spPr/>
+        <p:txBody>
+          <a:bodyPr/>
+          <a:lstStyle/>
+          <a:p>
+            <a:endParaRPr lang="ko-KR" altLang="en-US"/>
+          </a:p>
+        </p:txBody>
+      </p:sp>
+    </p:spTree>
+    <p:extLst>
+      <p:ext uri="{BB962C8B-B14F-4D97-AF65-F5344CB8AC3E}">
+        <p14:creationId xmlns:p14="http://schemas.microsoft.com/office/powerpoint/2010/main" val="828267970"/>
+      </p:ext>
+    </p:extLst>
+  </p:cSld>
+  <p:clrMapOvr>
+    <a:masterClrMapping/>
+  </p:clrMapOvr>
+</p:sld>
+</file>
+
+<file path=ppt/slides/slide24.xml><?xml version="1.0" encoding="utf-8"?>
+<p:sld xmlns:a="http://schemas.openxmlformats.org/drawingml/2006/main" xmlns:r="http://schemas.openxmlformats.org/officeDocument/2006/relationships" xmlns:p="http://schemas.openxmlformats.org/presentationml/2006/main">
+  <p:cSld>
+    <p:spTree>
+      <p:nvGrpSpPr>
+        <p:cNvPr id="1" name=""/>
+        <p:cNvGrpSpPr/>
+        <p:nvPr/>
+      </p:nvGrpSpPr>
+      <p:grpSpPr>
+        <a:xfrm>
+          <a:off x="0" y="0"/>
+          <a:ext cx="0" cy="0"/>
+          <a:chOff x="0" y="0"/>
+          <a:chExt cx="0" cy="0"/>
+        </a:xfrm>
+      </p:grpSpPr>
+      <p:sp>
+        <p:nvSpPr>
+          <p:cNvPr id="2" name="제목 1">
+            <a:extLst>
+              <a:ext uri="{FF2B5EF4-FFF2-40B4-BE49-F238E27FC236}">
+                <a16:creationId xmlns:a16="http://schemas.microsoft.com/office/drawing/2014/main" id="{0A369040-E1C4-B9A4-6456-1FE71B51C3C8}"/>
+              </a:ext>
+            </a:extLst>
+          </p:cNvPr>
+          <p:cNvSpPr>
+            <a:spLocks noGrp="1"/>
+          </p:cNvSpPr>
+          <p:nvPr>
+            <p:ph type="title"/>
+          </p:nvPr>
+        </p:nvSpPr>
+        <p:spPr/>
+        <p:txBody>
+          <a:bodyPr/>
+          <a:lstStyle/>
+          <a:p>
+            <a:r>
+              <a:rPr lang="en-US" altLang="ko-KR" dirty="0"/>
+              <a:t>ICMP</a:t>
+            </a:r>
+            <a:endParaRPr lang="ko-KR" altLang="en-US" dirty="0"/>
+          </a:p>
+        </p:txBody>
+      </p:sp>
+      <p:sp>
+        <p:nvSpPr>
+          <p:cNvPr id="3" name="내용 개체 틀 2">
+            <a:extLst>
+              <a:ext uri="{FF2B5EF4-FFF2-40B4-BE49-F238E27FC236}">
+                <a16:creationId xmlns:a16="http://schemas.microsoft.com/office/drawing/2014/main" id="{6FCC135F-16CD-C5ED-CA5F-C86F45C50872}"/>
+              </a:ext>
+            </a:extLst>
+          </p:cNvPr>
+          <p:cNvSpPr>
+            <a:spLocks noGrp="1"/>
+          </p:cNvSpPr>
+          <p:nvPr>
+            <p:ph idx="1"/>
+          </p:nvPr>
+        </p:nvSpPr>
+        <p:spPr/>
+        <p:txBody>
+          <a:bodyPr/>
+          <a:lstStyle/>
+          <a:p>
+            <a:endParaRPr lang="ko-KR" altLang="en-US"/>
+          </a:p>
+        </p:txBody>
+      </p:sp>
+    </p:spTree>
+    <p:extLst>
+      <p:ext uri="{BB962C8B-B14F-4D97-AF65-F5344CB8AC3E}">
+        <p14:creationId xmlns:p14="http://schemas.microsoft.com/office/powerpoint/2010/main" val="2525825330"/>
+      </p:ext>
+    </p:extLst>
+  </p:cSld>
+  <p:clrMapOvr>
+    <a:masterClrMapping/>
+  </p:clrMapOvr>
+</p:sld>
+</file>
+
+<file path=ppt/slides/slide25.xml><?xml version="1.0" encoding="utf-8"?>
+<p:sld xmlns:a="http://schemas.openxmlformats.org/drawingml/2006/main" xmlns:r="http://schemas.openxmlformats.org/officeDocument/2006/relationships" xmlns:p="http://schemas.openxmlformats.org/presentationml/2006/main">
+  <p:cSld>
+    <p:spTree>
+      <p:nvGrpSpPr>
+        <p:cNvPr id="1" name=""/>
+        <p:cNvGrpSpPr/>
+        <p:nvPr/>
+      </p:nvGrpSpPr>
+      <p:grpSpPr>
+        <a:xfrm>
+          <a:off x="0" y="0"/>
+          <a:ext cx="0" cy="0"/>
+          <a:chOff x="0" y="0"/>
+          <a:chExt cx="0" cy="0"/>
+        </a:xfrm>
+      </p:grpSpPr>
+      <p:sp>
+        <p:nvSpPr>
+          <p:cNvPr id="2" name="제목 1">
+            <a:extLst>
+              <a:ext uri="{FF2B5EF4-FFF2-40B4-BE49-F238E27FC236}">
+                <a16:creationId xmlns:a16="http://schemas.microsoft.com/office/drawing/2014/main" id="{1314160E-EB42-1B88-7D1E-DBFA15A199DB}"/>
+              </a:ext>
+            </a:extLst>
+          </p:cNvPr>
+          <p:cNvSpPr>
+            <a:spLocks noGrp="1"/>
+          </p:cNvSpPr>
+          <p:nvPr>
+            <p:ph type="title"/>
+          </p:nvPr>
+        </p:nvSpPr>
+        <p:spPr/>
+        <p:txBody>
+          <a:bodyPr/>
+          <a:lstStyle/>
+          <a:p>
+            <a:r>
+              <a:rPr lang="en-US" altLang="ko-KR" dirty="0"/>
+              <a:t>Router</a:t>
+            </a:r>
+            <a:endParaRPr lang="ko-KR" altLang="en-US" dirty="0"/>
+          </a:p>
+        </p:txBody>
+      </p:sp>
+      <p:sp>
+        <p:nvSpPr>
+          <p:cNvPr id="3" name="내용 개체 틀 2">
+            <a:extLst>
+              <a:ext uri="{FF2B5EF4-FFF2-40B4-BE49-F238E27FC236}">
+                <a16:creationId xmlns:a16="http://schemas.microsoft.com/office/drawing/2014/main" id="{3D53C142-D1EA-562D-67CC-A05387B237DF}"/>
+              </a:ext>
+            </a:extLst>
+          </p:cNvPr>
+          <p:cNvSpPr>
+            <a:spLocks noGrp="1"/>
+          </p:cNvSpPr>
+          <p:nvPr>
+            <p:ph idx="1"/>
+          </p:nvPr>
+        </p:nvSpPr>
+        <p:spPr/>
+        <p:txBody>
+          <a:bodyPr/>
+          <a:lstStyle/>
+          <a:p>
+            <a:endParaRPr lang="ko-KR" altLang="en-US"/>
+          </a:p>
+        </p:txBody>
+      </p:sp>
+    </p:spTree>
+    <p:extLst>
+      <p:ext uri="{BB962C8B-B14F-4D97-AF65-F5344CB8AC3E}">
+        <p14:creationId xmlns:p14="http://schemas.microsoft.com/office/powerpoint/2010/main" val="1656999248"/>
+      </p:ext>
+    </p:extLst>
+  </p:cSld>
+  <p:clrMapOvr>
+    <a:masterClrMapping/>
+  </p:clrMapOvr>
+</p:sld>
+</file>
+
+<file path=ppt/slides/slide26.xml><?xml version="1.0" encoding="utf-8"?>
+<p:sld xmlns:a="http://schemas.openxmlformats.org/drawingml/2006/main" xmlns:r="http://schemas.openxmlformats.org/officeDocument/2006/relationships" xmlns:p="http://schemas.openxmlformats.org/presentationml/2006/main">
+  <p:cSld>
+    <p:spTree>
+      <p:nvGrpSpPr>
+        <p:cNvPr id="1" name=""/>
+        <p:cNvGrpSpPr/>
+        <p:nvPr/>
+      </p:nvGrpSpPr>
+      <p:grpSpPr>
+        <a:xfrm>
+          <a:off x="0" y="0"/>
+          <a:ext cx="0" cy="0"/>
+          <a:chOff x="0" y="0"/>
+          <a:chExt cx="0" cy="0"/>
+        </a:xfrm>
+      </p:grpSpPr>
+      <p:sp>
+        <p:nvSpPr>
+          <p:cNvPr id="2" name="제목 1">
+            <a:extLst>
+              <a:ext uri="{FF2B5EF4-FFF2-40B4-BE49-F238E27FC236}">
+                <a16:creationId xmlns:a16="http://schemas.microsoft.com/office/drawing/2014/main" id="{D521AC9A-E519-EE7F-1217-F1D2B6EEEBD2}"/>
+              </a:ext>
+            </a:extLst>
+          </p:cNvPr>
+          <p:cNvSpPr>
+            <a:spLocks noGrp="1"/>
+          </p:cNvSpPr>
+          <p:nvPr>
+            <p:ph type="title"/>
+          </p:nvPr>
+        </p:nvSpPr>
+        <p:spPr/>
+        <p:txBody>
+          <a:bodyPr/>
+          <a:lstStyle/>
+          <a:p>
+            <a:r>
+              <a:rPr lang="en-US" altLang="ko-KR" dirty="0"/>
+              <a:t>OSPF, RIP (Intra-AS)</a:t>
+            </a:r>
+            <a:endParaRPr lang="ko-KR" altLang="en-US" dirty="0"/>
+          </a:p>
+        </p:txBody>
+      </p:sp>
+      <p:sp>
+        <p:nvSpPr>
+          <p:cNvPr id="3" name="내용 개체 틀 2">
+            <a:extLst>
+              <a:ext uri="{FF2B5EF4-FFF2-40B4-BE49-F238E27FC236}">
+                <a16:creationId xmlns:a16="http://schemas.microsoft.com/office/drawing/2014/main" id="{CDD3BA5E-AB57-8DB7-09B8-05453F235F00}"/>
+              </a:ext>
+            </a:extLst>
+          </p:cNvPr>
+          <p:cNvSpPr>
+            <a:spLocks noGrp="1"/>
+          </p:cNvSpPr>
+          <p:nvPr>
+            <p:ph idx="1"/>
+          </p:nvPr>
+        </p:nvSpPr>
+        <p:spPr/>
+        <p:txBody>
+          <a:bodyPr/>
+          <a:lstStyle/>
+          <a:p>
+            <a:endParaRPr lang="ko-KR" altLang="en-US"/>
+          </a:p>
+        </p:txBody>
+      </p:sp>
+    </p:spTree>
+    <p:extLst>
+      <p:ext uri="{BB962C8B-B14F-4D97-AF65-F5344CB8AC3E}">
+        <p14:creationId xmlns:p14="http://schemas.microsoft.com/office/powerpoint/2010/main" val="3967982616"/>
+      </p:ext>
+    </p:extLst>
+  </p:cSld>
+  <p:clrMapOvr>
+    <a:masterClrMapping/>
+  </p:clrMapOvr>
+</p:sld>
+</file>
+
+<file path=ppt/slides/slide27.xml><?xml version="1.0" encoding="utf-8"?>
+<p:sld xmlns:a="http://schemas.openxmlformats.org/drawingml/2006/main" xmlns:r="http://schemas.openxmlformats.org/officeDocument/2006/relationships" xmlns:p="http://schemas.openxmlformats.org/presentationml/2006/main">
+  <p:cSld>
+    <p:spTree>
+      <p:nvGrpSpPr>
+        <p:cNvPr id="1" name=""/>
+        <p:cNvGrpSpPr/>
+        <p:nvPr/>
+      </p:nvGrpSpPr>
+      <p:grpSpPr>
+        <a:xfrm>
+          <a:off x="0" y="0"/>
+          <a:ext cx="0" cy="0"/>
+          <a:chOff x="0" y="0"/>
+          <a:chExt cx="0" cy="0"/>
+        </a:xfrm>
+      </p:grpSpPr>
+      <p:sp>
+        <p:nvSpPr>
+          <p:cNvPr id="2" name="제목 1">
+            <a:extLst>
+              <a:ext uri="{FF2B5EF4-FFF2-40B4-BE49-F238E27FC236}">
+                <a16:creationId xmlns:a16="http://schemas.microsoft.com/office/drawing/2014/main" id="{83291C9C-B7B2-84E0-221D-4E262D0A1D2F}"/>
+              </a:ext>
+            </a:extLst>
+          </p:cNvPr>
+          <p:cNvSpPr>
+            <a:spLocks noGrp="1"/>
+          </p:cNvSpPr>
+          <p:nvPr>
+            <p:ph type="title"/>
+          </p:nvPr>
+        </p:nvSpPr>
+        <p:spPr/>
+        <p:txBody>
+          <a:bodyPr/>
+          <a:lstStyle/>
+          <a:p>
+            <a:r>
+              <a:rPr lang="en-US" altLang="ko-KR" dirty="0"/>
+              <a:t>BGP (Inter-AS)</a:t>
+            </a:r>
+            <a:endParaRPr lang="ko-KR" altLang="en-US" dirty="0"/>
+          </a:p>
+        </p:txBody>
+      </p:sp>
+      <p:sp>
+        <p:nvSpPr>
+          <p:cNvPr id="3" name="내용 개체 틀 2">
+            <a:extLst>
+              <a:ext uri="{FF2B5EF4-FFF2-40B4-BE49-F238E27FC236}">
+                <a16:creationId xmlns:a16="http://schemas.microsoft.com/office/drawing/2014/main" id="{F25F7E1C-3B60-656A-ACE4-D9E85DB99641}"/>
+              </a:ext>
+            </a:extLst>
+          </p:cNvPr>
+          <p:cNvSpPr>
+            <a:spLocks noGrp="1"/>
+          </p:cNvSpPr>
+          <p:nvPr>
+            <p:ph idx="1"/>
+          </p:nvPr>
+        </p:nvSpPr>
+        <p:spPr/>
+        <p:txBody>
+          <a:bodyPr/>
+          <a:lstStyle/>
+          <a:p>
+            <a:endParaRPr lang="ko-KR" altLang="en-US"/>
+          </a:p>
+        </p:txBody>
+      </p:sp>
+    </p:spTree>
+    <p:extLst>
+      <p:ext uri="{BB962C8B-B14F-4D97-AF65-F5344CB8AC3E}">
+        <p14:creationId xmlns:p14="http://schemas.microsoft.com/office/powerpoint/2010/main" val="444810247"/>
+      </p:ext>
+    </p:extLst>
+  </p:cSld>
+  <p:clrMapOvr>
+    <a:masterClrMapping/>
+  </p:clrMapOvr>
+</p:sld>
+</file>
+
+<file path=ppt/slides/slide28.xml><?xml version="1.0" encoding="utf-8"?>
+<p:sld xmlns:a="http://schemas.openxmlformats.org/drawingml/2006/main" xmlns:r="http://schemas.openxmlformats.org/officeDocument/2006/relationships" xmlns:p="http://schemas.openxmlformats.org/presentationml/2006/main">
+  <p:cSld>
+    <p:spTree>
+      <p:nvGrpSpPr>
+        <p:cNvPr id="1" name=""/>
+        <p:cNvGrpSpPr/>
+        <p:nvPr/>
+      </p:nvGrpSpPr>
+      <p:grpSpPr>
+        <a:xfrm>
+          <a:off x="0" y="0"/>
+          <a:ext cx="0" cy="0"/>
+          <a:chOff x="0" y="0"/>
+          <a:chExt cx="0" cy="0"/>
+        </a:xfrm>
+      </p:grpSpPr>
+      <p:sp>
+        <p:nvSpPr>
+          <p:cNvPr id="2" name="제목 1">
+            <a:extLst>
+              <a:ext uri="{FF2B5EF4-FFF2-40B4-BE49-F238E27FC236}">
+                <a16:creationId xmlns:a16="http://schemas.microsoft.com/office/drawing/2014/main" id="{C4F4B957-4A6D-57BD-C54A-A2260F4DF448}"/>
+              </a:ext>
+            </a:extLst>
+          </p:cNvPr>
+          <p:cNvSpPr>
+            <a:spLocks noGrp="1"/>
+          </p:cNvSpPr>
+          <p:nvPr>
+            <p:ph type="title"/>
+          </p:nvPr>
+        </p:nvSpPr>
+        <p:spPr/>
+        <p:txBody>
+          <a:bodyPr/>
+          <a:lstStyle/>
+          <a:p>
+            <a:r>
+              <a:rPr lang="en-US" altLang="ko-KR" dirty="0"/>
+              <a:t>Hot Potato Routing</a:t>
+            </a:r>
+            <a:endParaRPr lang="ko-KR" altLang="en-US" dirty="0"/>
+          </a:p>
+        </p:txBody>
+      </p:sp>
+      <p:sp>
+        <p:nvSpPr>
+          <p:cNvPr id="3" name="내용 개체 틀 2">
+            <a:extLst>
+              <a:ext uri="{FF2B5EF4-FFF2-40B4-BE49-F238E27FC236}">
+                <a16:creationId xmlns:a16="http://schemas.microsoft.com/office/drawing/2014/main" id="{63BB3511-1B5A-9ACA-0939-41123542E162}"/>
+              </a:ext>
+            </a:extLst>
+          </p:cNvPr>
+          <p:cNvSpPr>
+            <a:spLocks noGrp="1"/>
+          </p:cNvSpPr>
+          <p:nvPr>
+            <p:ph idx="1"/>
+          </p:nvPr>
+        </p:nvSpPr>
+        <p:spPr/>
+        <p:txBody>
+          <a:bodyPr/>
+          <a:lstStyle/>
+          <a:p>
+            <a:endParaRPr lang="ko-KR" altLang="en-US"/>
+          </a:p>
+        </p:txBody>
+      </p:sp>
+    </p:spTree>
+    <p:extLst>
+      <p:ext uri="{BB962C8B-B14F-4D97-AF65-F5344CB8AC3E}">
+        <p14:creationId xmlns:p14="http://schemas.microsoft.com/office/powerpoint/2010/main" val="3920241493"/>
+      </p:ext>
+    </p:extLst>
+  </p:cSld>
+  <p:clrMapOvr>
+    <a:masterClrMapping/>
+  </p:clrMapOvr>
+</p:sld>
+</file>
+
+<file path=ppt/slides/slide29.xml><?xml version="1.0" encoding="utf-8"?>
+<p:sld xmlns:a="http://schemas.openxmlformats.org/drawingml/2006/main" xmlns:r="http://schemas.openxmlformats.org/officeDocument/2006/relationships" xmlns:p="http://schemas.openxmlformats.org/presentationml/2006/main">
+  <p:cSld>
+    <p:spTree>
+      <p:nvGrpSpPr>
+        <p:cNvPr id="1" name=""/>
+        <p:cNvGrpSpPr/>
+        <p:nvPr/>
+      </p:nvGrpSpPr>
+      <p:grpSpPr>
+        <a:xfrm>
+          <a:off x="0" y="0"/>
+          <a:ext cx="0" cy="0"/>
+          <a:chOff x="0" y="0"/>
+          <a:chExt cx="0" cy="0"/>
+        </a:xfrm>
+      </p:grpSpPr>
+      <p:sp>
+        <p:nvSpPr>
+          <p:cNvPr id="2" name="제목 1">
+            <a:extLst>
+              <a:ext uri="{FF2B5EF4-FFF2-40B4-BE49-F238E27FC236}">
+                <a16:creationId xmlns:a16="http://schemas.microsoft.com/office/drawing/2014/main" id="{DE0B4145-EAC0-56B9-357D-D3D49295988A}"/>
+              </a:ext>
+            </a:extLst>
+          </p:cNvPr>
+          <p:cNvSpPr>
+            <a:spLocks noGrp="1"/>
+          </p:cNvSpPr>
+          <p:nvPr>
+            <p:ph type="title"/>
+          </p:nvPr>
+        </p:nvSpPr>
+        <p:spPr/>
+        <p:txBody>
+          <a:bodyPr/>
+          <a:lstStyle/>
+          <a:p>
+            <a:r>
+              <a:rPr lang="en-US" altLang="ko-KR" dirty="0"/>
+              <a:t>IPv6</a:t>
+            </a:r>
+            <a:endParaRPr lang="ko-KR" altLang="en-US" dirty="0"/>
+          </a:p>
+        </p:txBody>
+      </p:sp>
+      <p:sp>
+        <p:nvSpPr>
+          <p:cNvPr id="3" name="내용 개체 틀 2">
+            <a:extLst>
+              <a:ext uri="{FF2B5EF4-FFF2-40B4-BE49-F238E27FC236}">
+                <a16:creationId xmlns:a16="http://schemas.microsoft.com/office/drawing/2014/main" id="{CBC7348E-060B-EFA3-96FF-1B26127854E0}"/>
+              </a:ext>
+            </a:extLst>
+          </p:cNvPr>
+          <p:cNvSpPr>
+            <a:spLocks noGrp="1"/>
+          </p:cNvSpPr>
+          <p:nvPr>
+            <p:ph idx="1"/>
+          </p:nvPr>
+        </p:nvSpPr>
+        <p:spPr/>
+        <p:txBody>
+          <a:bodyPr/>
+          <a:lstStyle/>
+          <a:p>
+            <a:endParaRPr lang="ko-KR" altLang="en-US"/>
+          </a:p>
+        </p:txBody>
+      </p:sp>
+    </p:spTree>
+    <p:extLst>
+      <p:ext uri="{BB962C8B-B14F-4D97-AF65-F5344CB8AC3E}">
+        <p14:creationId xmlns:p14="http://schemas.microsoft.com/office/powerpoint/2010/main" val="1107915543"/>
       </p:ext>
     </p:extLst>
   </p:cSld>
@@ -5213,7 +6381,7 @@
           <a:bodyPr/>
           <a:lstStyle/>
           <a:p>
-            <a:endParaRPr lang="ko-KR" altLang="en-US"/>
+            <a:endParaRPr lang="ko-KR" altLang="en-US" sz="1600" dirty="0"/>
           </a:p>
         </p:txBody>
       </p:sp>
@@ -5438,12 +6606,17 @@
           <a:p>
             <a:r>
               <a:rPr lang="en-US" altLang="ko-KR" dirty="0"/>
-              <a:t>TCP </a:t>
+              <a:t>TCP Segment </a:t>
             </a:r>
             <a:r>
               <a:rPr lang="ko-KR" altLang="en-US" dirty="0"/>
-              <a:t>구조</a:t>
-            </a:r>
+              <a:t>구조 </a:t>
+            </a:r>
+            <a:r>
+              <a:rPr lang="en-US" altLang="ko-KR" dirty="0"/>
+              <a:t>1</a:t>
+            </a:r>
+            <a:endParaRPr lang="ko-KR" altLang="en-US" dirty="0"/>
           </a:p>
         </p:txBody>
       </p:sp>
@@ -5507,7 +6680,7 @@
           <p:cNvPr id="2" name="제목 1">
             <a:extLst>
               <a:ext uri="{FF2B5EF4-FFF2-40B4-BE49-F238E27FC236}">
-                <a16:creationId xmlns:a16="http://schemas.microsoft.com/office/drawing/2014/main" id="{43D38F18-6FA0-0B1E-2019-1597F08872FF}"/>
+                <a16:creationId xmlns:a16="http://schemas.microsoft.com/office/drawing/2014/main" id="{F52BD87A-4D8D-C603-EB8D-673068AB8E10}"/>
               </a:ext>
             </a:extLst>
           </p:cNvPr>
@@ -5525,12 +6698,17 @@
           <a:p>
             <a:r>
               <a:rPr lang="en-US" altLang="ko-KR" dirty="0"/>
-              <a:t>UDP</a:t>
+              <a:t>TCP Segment </a:t>
             </a:r>
             <a:r>
               <a:rPr lang="ko-KR" altLang="en-US" dirty="0"/>
-              <a:t> 구조</a:t>
-            </a:r>
+              <a:t>구조 </a:t>
+            </a:r>
+            <a:r>
+              <a:rPr lang="en-US" altLang="ko-KR" dirty="0"/>
+              <a:t>2</a:t>
+            </a:r>
+            <a:endParaRPr lang="ko-KR" altLang="en-US" dirty="0"/>
           </a:p>
         </p:txBody>
       </p:sp>
@@ -5539,7 +6717,7 @@
           <p:cNvPr id="3" name="내용 개체 틀 2">
             <a:extLst>
               <a:ext uri="{FF2B5EF4-FFF2-40B4-BE49-F238E27FC236}">
-                <a16:creationId xmlns:a16="http://schemas.microsoft.com/office/drawing/2014/main" id="{E219FBED-2F1A-E107-7238-972DF2A80D97}"/>
+                <a16:creationId xmlns:a16="http://schemas.microsoft.com/office/drawing/2014/main" id="{B220F792-916D-0047-E121-C8239CC4A160}"/>
               </a:ext>
             </a:extLst>
           </p:cNvPr>
@@ -5562,7 +6740,7 @@
     </p:spTree>
     <p:extLst>
       <p:ext uri="{BB962C8B-B14F-4D97-AF65-F5344CB8AC3E}">
-        <p14:creationId xmlns:p14="http://schemas.microsoft.com/office/powerpoint/2010/main" val="1614672160"/>
+        <p14:creationId xmlns:p14="http://schemas.microsoft.com/office/powerpoint/2010/main" val="1997239339"/>
       </p:ext>
     </p:extLst>
   </p:cSld>
@@ -5594,7 +6772,7 @@
           <p:cNvPr id="2" name="제목 1">
             <a:extLst>
               <a:ext uri="{FF2B5EF4-FFF2-40B4-BE49-F238E27FC236}">
-                <a16:creationId xmlns:a16="http://schemas.microsoft.com/office/drawing/2014/main" id="{9683C281-FEF9-3C44-E7C0-5C739AD4BFC0}"/>
+                <a16:creationId xmlns:a16="http://schemas.microsoft.com/office/drawing/2014/main" id="{43D38F18-6FA0-0B1E-2019-1597F08872FF}"/>
               </a:ext>
             </a:extLst>
           </p:cNvPr>
@@ -5611,17 +6789,26 @@
           <a:lstStyle/>
           <a:p>
             <a:r>
+              <a:rPr lang="en-US" altLang="ko-KR" dirty="0"/>
+              <a:t>UDP</a:t>
+            </a:r>
+            <a:r>
               <a:rPr lang="ko-KR" altLang="en-US" dirty="0"/>
-              <a:t>흐름제어</a:t>
+              <a:t> </a:t>
             </a:r>
             <a:r>
               <a:rPr lang="en-US" altLang="ko-KR" dirty="0"/>
-              <a:t>, </a:t>
+              <a:t>Segment </a:t>
             </a:r>
             <a:r>
               <a:rPr lang="ko-KR" altLang="en-US" dirty="0"/>
-              <a:t>혼잡제어</a:t>
-            </a:r>
+              <a:t>구조 </a:t>
+            </a:r>
+            <a:r>
+              <a:rPr lang="en-US" altLang="ko-KR" dirty="0"/>
+              <a:t>1</a:t>
+            </a:r>
+            <a:endParaRPr lang="ko-KR" altLang="en-US" dirty="0"/>
           </a:p>
         </p:txBody>
       </p:sp>
@@ -5630,7 +6817,7 @@
           <p:cNvPr id="3" name="내용 개체 틀 2">
             <a:extLst>
               <a:ext uri="{FF2B5EF4-FFF2-40B4-BE49-F238E27FC236}">
-                <a16:creationId xmlns:a16="http://schemas.microsoft.com/office/drawing/2014/main" id="{C2A9C482-02F9-76FC-47DC-F5E54241D9EF}"/>
+                <a16:creationId xmlns:a16="http://schemas.microsoft.com/office/drawing/2014/main" id="{E219FBED-2F1A-E107-7238-972DF2A80D97}"/>
               </a:ext>
             </a:extLst>
           </p:cNvPr>
@@ -5653,7 +6840,7 @@
     </p:spTree>
     <p:extLst>
       <p:ext uri="{BB962C8B-B14F-4D97-AF65-F5344CB8AC3E}">
-        <p14:creationId xmlns:p14="http://schemas.microsoft.com/office/powerpoint/2010/main" val="682097685"/>
+        <p14:creationId xmlns:p14="http://schemas.microsoft.com/office/powerpoint/2010/main" val="1614672160"/>
       </p:ext>
     </p:extLst>
   </p:cSld>

</xml_diff>

<commit_message>
Update 3.pptx 16 ~ 27
</commit_message>
<xml_diff>
--- a/2.pptx
+++ b/2.pptx
@@ -292,7 +292,7 @@
           <a:p>
             <a:fld id="{76969C88-B244-455D-A017-012B25B1ACDD}" type="datetimeFigureOut">
               <a:rPr lang="en-US" smtClean="0"/>
-              <a:t>2/2/2024</a:t>
+              <a:t>2/5/2024</a:t>
             </a:fld>
             <a:endParaRPr lang="en-US"/>
           </a:p>
@@ -506,7 +506,7 @@
           <a:p>
             <a:fld id="{76969C88-B244-455D-A017-012B25B1ACDD}" type="datetimeFigureOut">
               <a:rPr lang="en-US" smtClean="0"/>
-              <a:t>2/2/2024</a:t>
+              <a:t>2/5/2024</a:t>
             </a:fld>
             <a:endParaRPr lang="en-US"/>
           </a:p>
@@ -730,7 +730,7 @@
           <a:p>
             <a:fld id="{76969C88-B244-455D-A017-012B25B1ACDD}" type="datetimeFigureOut">
               <a:rPr lang="en-US" smtClean="0"/>
-              <a:t>2/2/2024</a:t>
+              <a:t>2/5/2024</a:t>
             </a:fld>
             <a:endParaRPr lang="en-US"/>
           </a:p>
@@ -970,7 +970,7 @@
           <a:p>
             <a:fld id="{76969C88-B244-455D-A017-012B25B1ACDD}" type="datetimeFigureOut">
               <a:rPr lang="en-US" smtClean="0"/>
-              <a:t>2/2/2024</a:t>
+              <a:t>2/5/2024</a:t>
             </a:fld>
             <a:endParaRPr lang="en-US" dirty="0"/>
           </a:p>
@@ -1191,7 +1191,7 @@
           <a:p>
             <a:fld id="{76969C88-B244-455D-A017-012B25B1ACDD}" type="datetimeFigureOut">
               <a:rPr lang="en-US" smtClean="0"/>
-              <a:t>2/2/2024</a:t>
+              <a:t>2/5/2024</a:t>
             </a:fld>
             <a:endParaRPr lang="en-US"/>
           </a:p>
@@ -1481,7 +1481,7 @@
           <a:p>
             <a:fld id="{76969C88-B244-455D-A017-012B25B1ACDD}" type="datetimeFigureOut">
               <a:rPr lang="en-US" smtClean="0"/>
-              <a:t>2/2/2024</a:t>
+              <a:t>2/5/2024</a:t>
             </a:fld>
             <a:endParaRPr lang="en-US"/>
           </a:p>
@@ -1839,7 +1839,7 @@
           <a:p>
             <a:fld id="{76969C88-B244-455D-A017-012B25B1ACDD}" type="datetimeFigureOut">
               <a:rPr lang="en-US" smtClean="0"/>
-              <a:t>2/2/2024</a:t>
+              <a:t>2/5/2024</a:t>
             </a:fld>
             <a:endParaRPr lang="en-US"/>
           </a:p>
@@ -2005,7 +2005,7 @@
           <a:p>
             <a:fld id="{76969C88-B244-455D-A017-012B25B1ACDD}" type="datetimeFigureOut">
               <a:rPr lang="en-US" smtClean="0"/>
-              <a:t>2/2/2024</a:t>
+              <a:t>2/5/2024</a:t>
             </a:fld>
             <a:endParaRPr lang="en-US"/>
           </a:p>
@@ -2064,7 +2064,7 @@
           <a:p>
             <a:fld id="{76969C88-B244-455D-A017-012B25B1ACDD}" type="datetimeFigureOut">
               <a:rPr lang="en-US" smtClean="0"/>
-              <a:t>2/2/2024</a:t>
+              <a:t>2/5/2024</a:t>
             </a:fld>
             <a:endParaRPr lang="en-US"/>
           </a:p>
@@ -2392,7 +2392,7 @@
           <a:p>
             <a:fld id="{76969C88-B244-455D-A017-012B25B1ACDD}" type="datetimeFigureOut">
               <a:rPr lang="en-US" smtClean="0"/>
-              <a:t>2/2/2024</a:t>
+              <a:t>2/5/2024</a:t>
             </a:fld>
             <a:endParaRPr lang="en-US"/>
           </a:p>
@@ -2699,7 +2699,7 @@
           <a:p>
             <a:fld id="{76969C88-B244-455D-A017-012B25B1ACDD}" type="datetimeFigureOut">
               <a:rPr lang="en-US" smtClean="0"/>
-              <a:t>2/2/2024</a:t>
+              <a:t>2/5/2024</a:t>
             </a:fld>
             <a:endParaRPr lang="en-US"/>
           </a:p>
@@ -3465,7 +3465,7 @@
             <a:fld id="{76969C88-B244-455D-A017-012B25B1ACDD}" type="datetimeFigureOut">
               <a:rPr lang="en-US" smtClean="0"/>
               <a:pPr/>
-              <a:t>2/2/2024</a:t>
+              <a:t>2/5/2024</a:t>
             </a:fld>
             <a:endParaRPr lang="en-US"/>
           </a:p>
@@ -17991,7 +17991,7 @@
             </a:r>
             <a:r>
               <a:rPr lang="ko-KR" altLang="en-US" sz="1600" dirty="0" err="1"/>
-              <a:t>복호문으로</a:t>
+              <a:t>복호열쇠로</a:t>
             </a:r>
             <a:r>
               <a:rPr lang="ko-KR" altLang="en-US" sz="1600" dirty="0"/>

</xml_diff>